<commit_message>
got covariates to work
its not estimating correctly but I dont have errors in the code now, now its a within the model problem not as much a structural problem
</commit_message>
<xml_diff>
--- a/notes/Covariate_notes.pptx
+++ b/notes/Covariate_notes.pptx
@@ -4460,7 +4460,7 @@
               <a:rPr lang="en-US" dirty="0">
                 <a:effectLst/>
               </a:rPr>
-              <a:t> </a:t>
+              <a:t> Focus on out migrating fish before their first winter</a:t>
             </a:r>
           </a:p>
           <a:p>
@@ -4607,7 +4607,7 @@
         <p:spPr>
           <a:xfrm>
             <a:off x="809296" y="725214"/>
-            <a:ext cx="10457972" cy="1754326"/>
+            <a:ext cx="10457972" cy="2862322"/>
           </a:xfrm>
           <a:prstGeom prst="rect">
             <a:avLst/>
@@ -4685,6 +4685,29 @@
                 <a:ea typeface="Calibri" panose="020F0502020204030204" pitchFamily="34" charset="0"/>
               </a:rPr>
               <a:t>: Higher temperatures lead to stress as fish are staging and preparing to return to FW (Howard &amp; von Biela, 2023b). </a:t>
+            </a:r>
+          </a:p>
+          <a:p>
+            <a:endParaRPr lang="en-US" dirty="0">
+              <a:latin typeface="Calibri Light" panose="020F0302020204030204" pitchFamily="34" charset="0"/>
+            </a:endParaRPr>
+          </a:p>
+          <a:p>
+            <a:endParaRPr lang="en-US" dirty="0">
+              <a:latin typeface="Calibri Light" panose="020F0302020204030204" pitchFamily="34" charset="0"/>
+            </a:endParaRPr>
+          </a:p>
+          <a:p>
+            <a:endParaRPr lang="en-US" dirty="0">
+              <a:latin typeface="Calibri Light" panose="020F0302020204030204" pitchFamily="34" charset="0"/>
+            </a:endParaRPr>
+          </a:p>
+          <a:p>
+            <a:r>
+              <a:rPr lang="en-US" dirty="0">
+                <a:latin typeface="Calibri Light" panose="020F0302020204030204" pitchFamily="34" charset="0"/>
+              </a:rPr>
+              <a:t>- could also consider GOA temperatures because it seems like a lot hang out there but may be too far removed. </a:t>
             </a:r>
             <a:endParaRPr lang="en-US" dirty="0"/>
           </a:p>
@@ -4734,8 +4757,8 @@
         </p:nvSpPr>
         <p:spPr>
           <a:xfrm>
-            <a:off x="201478" y="725214"/>
-            <a:ext cx="11964773" cy="7571303"/>
+            <a:off x="-3242" y="29175"/>
+            <a:ext cx="11964773" cy="8679299"/>
           </a:xfrm>
           <a:prstGeom prst="rect">
             <a:avLst/>
@@ -4853,65 +4876,11 @@
           </a:p>
           <a:p>
             <a:r>
-              <a:rPr lang="en-US" dirty="0">
-                <a:latin typeface="+mj-lt"/>
-              </a:rPr>
-              <a:t>Index format [I think I will try two indices]</a:t>
-            </a:r>
-          </a:p>
-          <a:p>
-            <a:r>
-              <a:rPr lang="en-US" dirty="0">
-                <a:latin typeface="+mj-lt"/>
-              </a:rPr>
-              <a:t>- Sum of all Pink salmon releases from Japan and Asia (</a:t>
-            </a:r>
-            <a:r>
-              <a:rPr lang="en-US" dirty="0" err="1">
-                <a:latin typeface="+mj-lt"/>
-              </a:rPr>
-              <a:t>Ruggerone</a:t>
-            </a:r>
-            <a:r>
-              <a:rPr lang="en-US" dirty="0">
-                <a:latin typeface="+mj-lt"/>
-              </a:rPr>
-              <a:t> 2003) OR total Pink salmon abundance (</a:t>
-            </a:r>
-            <a:r>
-              <a:rPr lang="en-US" dirty="0" err="1">
-                <a:latin typeface="+mj-lt"/>
-              </a:rPr>
-              <a:t>Cunnigham</a:t>
-            </a:r>
-            <a:r>
-              <a:rPr lang="en-US" dirty="0">
-                <a:latin typeface="+mj-lt"/>
-              </a:rPr>
-              <a:t> et al 2018 argue that this is a better metric </a:t>
-            </a:r>
-            <a:r>
-              <a:rPr lang="en-US" dirty="0" err="1">
-                <a:latin typeface="+mj-lt"/>
-              </a:rPr>
-              <a:t>bc</a:t>
-            </a:r>
-            <a:r>
-              <a:rPr lang="en-US" dirty="0">
-                <a:latin typeface="+mj-lt"/>
-              </a:rPr>
-              <a:t> there is a lot of marine mortality for hatchery pinks) </a:t>
-            </a:r>
-          </a:p>
-          <a:p>
-            <a:r>
-              <a:rPr lang="en-US" dirty="0">
-                <a:latin typeface="+mj-lt"/>
-              </a:rPr>
-              <a:t>- Sum of all Chum salmon releases from Japan, Asia and AK (Myers et al 2004) suggests Yukon chum and hatchery fish compete in the GOA.</a:t>
-            </a:r>
-          </a:p>
-          <a:p>
+              <a:rPr lang="en-US" b="1" dirty="0">
+                <a:latin typeface="+mj-lt"/>
+              </a:rPr>
+              <a:t>Index format (ended up creating 2)</a:t>
+            </a:r>
             <a:endParaRPr lang="en-US" dirty="0">
               <a:latin typeface="+mj-lt"/>
             </a:endParaRPr>
@@ -4921,7 +4890,104 @@
               <a:rPr lang="en-US" dirty="0">
                 <a:latin typeface="+mj-lt"/>
               </a:rPr>
+              <a:t>- Sum of all Pink salmon releases from AK and Asia (</a:t>
+            </a:r>
+            <a:r>
+              <a:rPr lang="en-US" dirty="0" err="1">
+                <a:latin typeface="+mj-lt"/>
+              </a:rPr>
+              <a:t>Ruggerone</a:t>
+            </a:r>
+            <a:r>
+              <a:rPr lang="en-US" dirty="0">
+                <a:latin typeface="+mj-lt"/>
+              </a:rPr>
+              <a:t> 2003) (saved as: output/</a:t>
+            </a:r>
+            <a:r>
+              <a:rPr lang="en-US" dirty="0" err="1">
+                <a:latin typeface="+mj-lt"/>
+              </a:rPr>
+              <a:t>hatchery_Pink_Covariate_AKandAsia.csv</a:t>
+            </a:r>
+            <a:r>
+              <a:rPr lang="en-US" dirty="0">
+                <a:latin typeface="+mj-lt"/>
+              </a:rPr>
+              <a:t>)</a:t>
+            </a:r>
+          </a:p>
+          <a:p>
+            <a:r>
+              <a:rPr lang="en-US" dirty="0">
+                <a:latin typeface="+mj-lt"/>
+              </a:rPr>
+              <a:t>	- OR total Pink salmon abundance (</a:t>
+            </a:r>
+            <a:r>
+              <a:rPr lang="en-US" dirty="0" err="1">
+                <a:latin typeface="+mj-lt"/>
+              </a:rPr>
+              <a:t>Cunnigham</a:t>
+            </a:r>
+            <a:r>
+              <a:rPr lang="en-US" dirty="0">
+                <a:latin typeface="+mj-lt"/>
+              </a:rPr>
+              <a:t> et al 2018 argue that this is a better metric </a:t>
+            </a:r>
+            <a:r>
+              <a:rPr lang="en-US" dirty="0" err="1">
+                <a:latin typeface="+mj-lt"/>
+              </a:rPr>
+              <a:t>bc</a:t>
+            </a:r>
+            <a:r>
+              <a:rPr lang="en-US" dirty="0">
+                <a:latin typeface="+mj-lt"/>
+              </a:rPr>
+              <a:t> there is a lot of marine mortality for hatchery pinks). Should consider but haven’t done it yet. </a:t>
+            </a:r>
+          </a:p>
+          <a:p>
+            <a:r>
+              <a:rPr lang="en-US" dirty="0">
+                <a:latin typeface="+mj-lt"/>
+              </a:rPr>
+              <a:t>- Sum of all Chum salmon releases from Japan, Asia and AK (Myers et al 2004) suggests Yukon chum and hatchery fish compete in the GOA. (saved as: output/</a:t>
+            </a:r>
+            <a:r>
+              <a:rPr lang="en-US" dirty="0" err="1">
+                <a:latin typeface="+mj-lt"/>
+              </a:rPr>
+              <a:t>hatchery_Chum_Covariate_AKandAsia.csv</a:t>
+            </a:r>
+            <a:r>
+              <a:rPr lang="en-US" dirty="0">
+                <a:latin typeface="+mj-lt"/>
+              </a:rPr>
+              <a:t>)</a:t>
+            </a:r>
+          </a:p>
+          <a:p>
+            <a:endParaRPr lang="en-US" dirty="0">
+              <a:latin typeface="+mj-lt"/>
+            </a:endParaRPr>
+          </a:p>
+          <a:p>
+            <a:r>
+              <a:rPr lang="en-US" dirty="0">
+                <a:latin typeface="+mj-lt"/>
+              </a:rPr>
               <a:t>Notes:</a:t>
+            </a:r>
+          </a:p>
+          <a:p>
+            <a:r>
+              <a:rPr lang="en-US" dirty="0">
+                <a:latin typeface="+mj-lt"/>
+              </a:rPr>
+              <a:t>- PWS pink is a huge hatchery, these should probably be included in the pink hatchery releases unless it is known that they don’t go to GOA? Seems unlikely </a:t>
             </a:r>
           </a:p>
           <a:p>
@@ -5133,13 +5199,8 @@
           <a:p>
             <a:r>
               <a:rPr lang="en-US" dirty="0"/>
-              <a:t>“shifts in prey composition for sockeye, chum and chinook between seasons, habitats, and salmon age groups were likely due to changes in prey availability. Davis et al 2003 – if prey availability is reduced by poor ocean conditions, increased food competition could decrease growth and survival of Yukon fish </a:t>
-            </a:r>
-            <a:r>
-              <a:rPr lang="en-US"/>
-              <a:t>in the BS and AI” - Myers et al 2004</a:t>
-            </a:r>
-            <a:endParaRPr lang="en-US" dirty="0"/>
+              <a:t>“shifts in prey composition for sockeye, chum and chinook between seasons, habitats, and salmon age groups were likely due to changes in prey availability. Davis et al 2003 – if prey availability is reduced by poor ocean conditions, increased food competition could decrease growth and survival of Yukon fish in the BS and AI” - Myers et al 2004</a:t>
+            </a:r>
           </a:p>
         </p:txBody>
       </p:sp>

</xml_diff>

<commit_message>
plotting and finish working with covariates
</commit_message>
<xml_diff>
--- a/notes/Covariate_notes.pptx
+++ b/notes/Covariate_notes.pptx
@@ -3347,8 +3347,8 @@
         </p:nvSpPr>
         <p:spPr>
           <a:xfrm>
-            <a:off x="809297" y="725214"/>
-            <a:ext cx="11227806" cy="3970318"/>
+            <a:off x="0" y="-79653"/>
+            <a:ext cx="12192000" cy="8125301"/>
           </a:xfrm>
           <a:prstGeom prst="rect">
             <a:avLst/>
@@ -3361,23 +3361,9 @@
           </a:bodyPr>
           <a:lstStyle/>
           <a:p>
-            <a:r>
-              <a:rPr lang="en-US" sz="1800" dirty="0">
-                <a:effectLst/>
-                <a:latin typeface="Calibri Light" panose="020F0302020204030204" pitchFamily="34" charset="0"/>
-                <a:ea typeface="Calibri" panose="020F0502020204030204" pitchFamily="34" charset="0"/>
-              </a:rPr>
-              <a:t>Ice-break day of year for mainstem rivers during brood year (t). </a:t>
-            </a:r>
-          </a:p>
-          <a:p>
-            <a:r>
-              <a:rPr lang="en-US" dirty="0"/>
-              <a:t>Stage A: FW-Juvenile in the EBS</a:t>
-            </a:r>
-          </a:p>
-          <a:p>
-            <a:endParaRPr lang="en-US" dirty="0"/>
+            <a:endParaRPr lang="en-US" dirty="0">
+              <a:latin typeface="+mj-lt"/>
+            </a:endParaRPr>
           </a:p>
           <a:p>
             <a:r>
@@ -3385,16 +3371,136 @@
                 <a:highlight>
                   <a:srgbClr val="FFFF00"/>
                 </a:highlight>
-              </a:rPr>
-              <a:t>Air temp </a:t>
-            </a:r>
-            <a:r>
-              <a:rPr lang="en-US" dirty="0"/>
-              <a:t>may be a better thing to use here. Miller and Weiss suggest. </a:t>
-            </a:r>
-          </a:p>
-          <a:p>
-            <a:endParaRPr lang="en-US" dirty="0"/>
+                <a:latin typeface="+mj-lt"/>
+              </a:rPr>
+              <a:t>Air temp : Stage A</a:t>
+            </a:r>
+          </a:p>
+          <a:p>
+            <a:r>
+              <a:rPr lang="en-US" dirty="0">
+                <a:latin typeface="+mj-lt"/>
+              </a:rPr>
+              <a:t>Source: https://</a:t>
+            </a:r>
+            <a:r>
+              <a:rPr lang="en-US" dirty="0" err="1">
+                <a:latin typeface="+mj-lt"/>
+              </a:rPr>
+              <a:t>wcc.sc.egov.usda.gov</a:t>
+            </a:r>
+            <a:r>
+              <a:rPr lang="en-US" dirty="0">
+                <a:latin typeface="+mj-lt"/>
+              </a:rPr>
+              <a:t>/</a:t>
+            </a:r>
+            <a:r>
+              <a:rPr lang="en-US" dirty="0" err="1">
+                <a:latin typeface="+mj-lt"/>
+              </a:rPr>
+              <a:t>nwcc</a:t>
+            </a:r>
+            <a:r>
+              <a:rPr lang="en-US" dirty="0">
+                <a:latin typeface="+mj-lt"/>
+              </a:rPr>
+              <a:t>/</a:t>
+            </a:r>
+            <a:r>
+              <a:rPr lang="en-US" dirty="0" err="1">
+                <a:latin typeface="+mj-lt"/>
+              </a:rPr>
+              <a:t>rgrpt?report</a:t>
+            </a:r>
+            <a:r>
+              <a:rPr lang="en-US" dirty="0">
+                <a:latin typeface="+mj-lt"/>
+              </a:rPr>
+              <a:t>=</a:t>
+            </a:r>
+            <a:r>
+              <a:rPr lang="en-US" dirty="0" err="1">
+                <a:latin typeface="+mj-lt"/>
+              </a:rPr>
+              <a:t>temperature_hist&amp;state</a:t>
+            </a:r>
+            <a:r>
+              <a:rPr lang="en-US" dirty="0">
+                <a:latin typeface="+mj-lt"/>
+              </a:rPr>
+              <a:t>=</a:t>
+            </a:r>
+            <a:r>
+              <a:rPr lang="en-US" dirty="0" err="1">
+                <a:latin typeface="+mj-lt"/>
+              </a:rPr>
+              <a:t>AK&amp;operation</a:t>
+            </a:r>
+            <a:r>
+              <a:rPr lang="en-US" dirty="0">
+                <a:latin typeface="+mj-lt"/>
+              </a:rPr>
+              <a:t>=View</a:t>
+            </a:r>
+          </a:p>
+          <a:p>
+            <a:r>
+              <a:rPr lang="en-US" dirty="0">
+                <a:latin typeface="+mj-lt"/>
+                <a:hlinkClick r:id="rId2"/>
+              </a:rPr>
+              <a:t>Map of options</a:t>
+            </a:r>
+            <a:endParaRPr lang="en-US" dirty="0">
+              <a:latin typeface="+mj-lt"/>
+            </a:endParaRPr>
+          </a:p>
+          <a:p>
+            <a:r>
+              <a:rPr lang="en-US" dirty="0">
+                <a:highlight>
+                  <a:srgbClr val="FFFF00"/>
+                </a:highlight>
+                <a:latin typeface="+mj-lt"/>
+              </a:rPr>
+              <a:t>Done</a:t>
+            </a:r>
+            <a:r>
+              <a:rPr lang="en-US" dirty="0">
+                <a:latin typeface="+mj-lt"/>
+              </a:rPr>
+              <a:t>: </a:t>
+            </a:r>
+            <a:r>
+              <a:rPr lang="en-US" dirty="0" err="1">
+                <a:latin typeface="+mj-lt"/>
+              </a:rPr>
+              <a:t>processed_covariates</a:t>
+            </a:r>
+            <a:r>
+              <a:rPr lang="en-US" dirty="0">
+                <a:latin typeface="+mj-lt"/>
+              </a:rPr>
+              <a:t>/</a:t>
+            </a:r>
+            <a:r>
+              <a:rPr lang="en-US" dirty="0" err="1">
+                <a:latin typeface="+mj-lt"/>
+              </a:rPr>
+              <a:t>Stage_A_airtemp.csv</a:t>
+            </a:r>
+            <a:r>
+              <a:rPr lang="en-US" dirty="0">
+                <a:latin typeface="+mj-lt"/>
+              </a:rPr>
+              <a:t>"</a:t>
+            </a:r>
+          </a:p>
+          <a:p>
+            <a:endParaRPr lang="en-US" dirty="0">
+              <a:latin typeface="+mj-lt"/>
+            </a:endParaRPr>
           </a:p>
           <a:p>
             <a:pPr marL="0" marR="0">
@@ -3408,7 +3514,7 @@
             <a:r>
               <a:rPr lang="en-US" sz="1800" b="1" dirty="0">
                 <a:effectLst/>
-                <a:latin typeface="Calibri Light" panose="020F0302020204030204" pitchFamily="34" charset="0"/>
+                <a:latin typeface="+mj-lt"/>
                 <a:ea typeface="Calibri" panose="020F0502020204030204" pitchFamily="34" charset="0"/>
               </a:rPr>
               <a:t>Hypothesis</a:t>
@@ -3416,14 +3522,14 @@
             <a:r>
               <a:rPr lang="en-US" sz="1800" dirty="0">
                 <a:effectLst/>
-                <a:latin typeface="Calibri Light" panose="020F0302020204030204" pitchFamily="34" charset="0"/>
+                <a:latin typeface="+mj-lt"/>
                 <a:ea typeface="Calibri" panose="020F0502020204030204" pitchFamily="34" charset="0"/>
               </a:rPr>
               <a:t>: positive relationship with Bering Sea juvenile abundance.</a:t>
             </a:r>
             <a:endParaRPr lang="en-US" sz="1800" dirty="0">
               <a:effectLst/>
-              <a:latin typeface="Times New Roman" panose="02020603050405020304" pitchFamily="18" charset="0"/>
+              <a:latin typeface="+mj-lt"/>
               <a:ea typeface="Times New Roman" panose="02020603050405020304" pitchFamily="18" charset="0"/>
             </a:endParaRPr>
           </a:p>
@@ -3431,7 +3537,7 @@
             <a:r>
               <a:rPr lang="en-US" sz="1800" b="1" dirty="0">
                 <a:effectLst/>
-                <a:latin typeface="Calibri Light" panose="020F0302020204030204" pitchFamily="34" charset="0"/>
+                <a:latin typeface="+mj-lt"/>
                 <a:ea typeface="Calibri" panose="020F0502020204030204" pitchFamily="34" charset="0"/>
               </a:rPr>
               <a:t>Mechanism</a:t>
@@ -3439,57 +3545,174 @@
             <a:r>
               <a:rPr lang="en-US" sz="1800" dirty="0">
                 <a:effectLst/>
-                <a:latin typeface="Calibri Light" panose="020F0302020204030204" pitchFamily="34" charset="0"/>
+                <a:latin typeface="+mj-lt"/>
                 <a:ea typeface="Calibri" panose="020F0502020204030204" pitchFamily="34" charset="0"/>
               </a:rPr>
               <a:t>: Earlier ice break up can facilitate a longer growing season resulting in larger fish upon ocean entry, associated with higher marine survival. </a:t>
             </a:r>
           </a:p>
           <a:p>
+            <a:endParaRPr lang="en-US" sz="1800" dirty="0">
+              <a:effectLst/>
+              <a:latin typeface="+mj-lt"/>
+              <a:ea typeface="Calibri" panose="020F0502020204030204" pitchFamily="34" charset="0"/>
+            </a:endParaRPr>
+          </a:p>
+          <a:p>
+            <a:r>
+              <a:rPr lang="en-US" dirty="0">
+                <a:latin typeface="+mj-lt"/>
+                <a:ea typeface="Calibri" panose="020F0502020204030204" pitchFamily="34" charset="0"/>
+              </a:rPr>
+              <a:t>** air temp correlated with water temp and ice break up and there are more complete air temp data sets</a:t>
+            </a:r>
+            <a:endParaRPr lang="en-US" sz="1800" dirty="0">
+              <a:effectLst/>
+              <a:latin typeface="+mj-lt"/>
+              <a:ea typeface="Calibri" panose="020F0502020204030204" pitchFamily="34" charset="0"/>
+            </a:endParaRPr>
+          </a:p>
+          <a:p>
             <a:endParaRPr lang="en-US" dirty="0">
-              <a:latin typeface="Calibri Light" panose="020F0302020204030204" pitchFamily="34" charset="0"/>
+              <a:latin typeface="+mj-lt"/>
             </a:endParaRPr>
           </a:p>
           <a:p>
             <a:r>
               <a:rPr lang="en-US" dirty="0">
-                <a:latin typeface="Calibri Light" panose="020F0302020204030204" pitchFamily="34" charset="0"/>
+                <a:latin typeface="+mj-lt"/>
+              </a:rPr>
+              <a:t>Currently have:</a:t>
+            </a:r>
+          </a:p>
+          <a:p>
+            <a:r>
+              <a:rPr lang="en-US" dirty="0" err="1">
+                <a:latin typeface="+mj-lt"/>
+              </a:rPr>
+              <a:t>Kusko</a:t>
+            </a:r>
+            <a:r>
+              <a:rPr lang="en-US" dirty="0">
+                <a:latin typeface="+mj-lt"/>
+              </a:rPr>
+              <a:t>: Aniak</a:t>
+            </a:r>
+          </a:p>
+          <a:p>
+            <a:r>
+              <a:rPr lang="en-US" dirty="0">
+                <a:latin typeface="+mj-lt"/>
+              </a:rPr>
+              <a:t>Yukon: Little Chena Ridge (not ideal but seems like best option)</a:t>
+            </a:r>
+          </a:p>
+          <a:p>
+            <a:endParaRPr lang="en-US" dirty="0">
+              <a:latin typeface="+mj-lt"/>
+            </a:endParaRPr>
+          </a:p>
+          <a:p>
+            <a:r>
+              <a:rPr lang="en-US" dirty="0">
+                <a:latin typeface="+mj-lt"/>
+              </a:rPr>
+              <a:t>Actual Index: Maximum and mean air temperatures for </a:t>
+            </a:r>
+            <a:r>
+              <a:rPr lang="en-US" b="1" dirty="0">
+                <a:latin typeface="+mj-lt"/>
+              </a:rPr>
+              <a:t>April and May </a:t>
+            </a:r>
+            <a:r>
+              <a:rPr lang="en-US" dirty="0">
+                <a:latin typeface="+mj-lt"/>
+              </a:rPr>
+              <a:t>are included to represent solar loading influencing snow-off and melt duration periods. Maximum and mean air temperatures during the migration period are proxies for water temperatures. (Miller Weiss)</a:t>
+            </a:r>
+          </a:p>
+          <a:p>
+            <a:endParaRPr lang="en-US" dirty="0">
+              <a:latin typeface="+mj-lt"/>
+            </a:endParaRPr>
+          </a:p>
+          <a:p>
+            <a:r>
+              <a:rPr lang="en-US" dirty="0">
+                <a:latin typeface="+mj-lt"/>
+              </a:rPr>
+              <a:t>Notes:</a:t>
+            </a:r>
+          </a:p>
+          <a:p>
+            <a:r>
+              <a:rPr lang="en-US" dirty="0">
+                <a:latin typeface="+mj-lt"/>
+              </a:rPr>
+              <a:t>Galena has a </a:t>
+            </a:r>
+            <a:r>
+              <a:rPr lang="en-US" dirty="0" err="1">
+                <a:latin typeface="+mj-lt"/>
+              </a:rPr>
+              <a:t>snotel</a:t>
+            </a:r>
+            <a:r>
+              <a:rPr lang="en-US" dirty="0">
+                <a:latin typeface="+mj-lt"/>
+              </a:rPr>
+              <a:t> but the air temp download has an error</a:t>
+            </a:r>
+          </a:p>
+          <a:p>
+            <a:pPr marL="0" marR="0">
+              <a:spcBef>
+                <a:spcPts val="0"/>
+              </a:spcBef>
+              <a:spcAft>
+                <a:spcPts val="0"/>
+              </a:spcAft>
+            </a:pPr>
+            <a:endParaRPr lang="en-US" dirty="0">
+              <a:latin typeface="+mj-lt"/>
+            </a:endParaRPr>
+          </a:p>
+          <a:p>
+            <a:r>
+              <a:rPr lang="en-US" dirty="0">
+                <a:latin typeface="+mj-lt"/>
               </a:rPr>
               <a:t>Miller and Weiss 2023 is a good resource for this </a:t>
             </a:r>
             <a:r>
               <a:rPr lang="en-US" dirty="0" err="1">
-                <a:latin typeface="Calibri Light" panose="020F0302020204030204" pitchFamily="34" charset="0"/>
+                <a:latin typeface="+mj-lt"/>
               </a:rPr>
               <a:t>lifestage</a:t>
             </a:r>
             <a:r>
               <a:rPr lang="en-US" dirty="0">
-                <a:latin typeface="Calibri Light" panose="020F0302020204030204" pitchFamily="34" charset="0"/>
+                <a:latin typeface="+mj-lt"/>
               </a:rPr>
               <a:t>- Yukon juveniles. </a:t>
             </a:r>
           </a:p>
           <a:p>
             <a:r>
-              <a:rPr lang="en-US" dirty="0"/>
-              <a:t>The most complete air temperature data for the analysis period were obtained from the Natural Resources Conservation Service (NRCS) snow telemetry station at Little Chena Ridge near Fairbanks</a:t>
-            </a:r>
-            <a:r>
-              <a:rPr lang="en-US" dirty="0">
-                <a:latin typeface="Calibri Light" panose="020F0302020204030204" pitchFamily="34" charset="0"/>
-              </a:rPr>
-              <a:t> (miller and Weiss)</a:t>
-            </a:r>
-          </a:p>
-          <a:p>
-            <a:r>
-              <a:rPr lang="en-US" dirty="0">
-                <a:latin typeface="Calibri Light" panose="020F0302020204030204" pitchFamily="34" charset="0"/>
+              <a:rPr lang="en-US" dirty="0">
+                <a:latin typeface="+mj-lt"/>
+              </a:rPr>
+              <a:t>The most complete air temperature data for the analysis period were obtained from the Natural Resources Conservation Service (NRCS) snow telemetry station at Little Chena Ridge near Fairbanks (miller and Weiss)</a:t>
+            </a:r>
+          </a:p>
+          <a:p>
+            <a:r>
+              <a:rPr lang="en-US" dirty="0">
+                <a:latin typeface="+mj-lt"/>
               </a:rPr>
               <a:t>They argue that air temperatures inform water temperatures  and there is a complete air temp dataset they use, water temps not complete</a:t>
             </a:r>
-            <a:endParaRPr lang="en-US" dirty="0"/>
           </a:p>
         </p:txBody>
       </p:sp>
@@ -3537,8 +3760,8 @@
         </p:nvSpPr>
         <p:spPr>
           <a:xfrm>
-            <a:off x="106716" y="215763"/>
-            <a:ext cx="11639227" cy="9233297"/>
+            <a:off x="0" y="-19370"/>
+            <a:ext cx="12192000" cy="10064294"/>
           </a:xfrm>
           <a:prstGeom prst="rect">
             <a:avLst/>
@@ -3669,6 +3892,113 @@
             </a:r>
           </a:p>
           <a:p>
+            <a:r>
+              <a:rPr lang="en-US" dirty="0">
+                <a:latin typeface="+mj-lt"/>
+              </a:rPr>
+              <a:t>- </a:t>
+            </a:r>
+            <a:r>
+              <a:rPr lang="en-US" dirty="0">
+                <a:highlight>
+                  <a:srgbClr val="FFFF00"/>
+                </a:highlight>
+                <a:latin typeface="+mj-lt"/>
+              </a:rPr>
+              <a:t>Index</a:t>
+            </a:r>
+            <a:r>
+              <a:rPr lang="en-US" dirty="0">
+                <a:latin typeface="+mj-lt"/>
+              </a:rPr>
+              <a:t> of </a:t>
+            </a:r>
+            <a:r>
+              <a:rPr lang="en-US" dirty="0">
+                <a:solidFill>
+                  <a:srgbClr val="000000"/>
+                </a:solidFill>
+                <a:latin typeface="+mj-lt"/>
+              </a:rPr>
+              <a:t>mean, max, min for June 15-July 15 of brood year. Done: </a:t>
+            </a:r>
+            <a:r>
+              <a:rPr lang="en-US" dirty="0" err="1">
+                <a:solidFill>
+                  <a:srgbClr val="000000"/>
+                </a:solidFill>
+                <a:latin typeface="+mj-lt"/>
+              </a:rPr>
+              <a:t>processed_covariates</a:t>
+            </a:r>
+            <a:r>
+              <a:rPr lang="en-US" dirty="0">
+                <a:solidFill>
+                  <a:srgbClr val="000000"/>
+                </a:solidFill>
+                <a:latin typeface="+mj-lt"/>
+              </a:rPr>
+              <a:t>/</a:t>
+            </a:r>
+            <a:r>
+              <a:rPr lang="en-US" dirty="0" err="1">
+                <a:solidFill>
+                  <a:srgbClr val="000000"/>
+                </a:solidFill>
+                <a:latin typeface="+mj-lt"/>
+              </a:rPr>
+              <a:t>Stage_a_Yukon_drainage.csv</a:t>
+            </a:r>
+            <a:r>
+              <a:rPr lang="en-US" dirty="0">
+                <a:solidFill>
+                  <a:srgbClr val="000000"/>
+                </a:solidFill>
+                <a:latin typeface="+mj-lt"/>
+              </a:rPr>
+              <a:t>"), </a:t>
+            </a:r>
+            <a:r>
+              <a:rPr lang="en-US" dirty="0" err="1">
+                <a:solidFill>
+                  <a:srgbClr val="000000"/>
+                </a:solidFill>
+                <a:latin typeface="+mj-lt"/>
+              </a:rPr>
+              <a:t>processed_covariates</a:t>
+            </a:r>
+            <a:r>
+              <a:rPr lang="en-US" dirty="0">
+                <a:solidFill>
+                  <a:srgbClr val="000000"/>
+                </a:solidFill>
+                <a:latin typeface="+mj-lt"/>
+              </a:rPr>
+              <a:t>/</a:t>
+            </a:r>
+            <a:r>
+              <a:rPr lang="en-US" dirty="0" err="1">
+                <a:solidFill>
+                  <a:srgbClr val="000000"/>
+                </a:solidFill>
+                <a:latin typeface="+mj-lt"/>
+              </a:rPr>
+              <a:t>Stage_a_kusko_drainage.csv</a:t>
+            </a:r>
+            <a:r>
+              <a:rPr lang="en-US" dirty="0">
+                <a:solidFill>
+                  <a:srgbClr val="000000"/>
+                </a:solidFill>
+                <a:latin typeface="+mj-lt"/>
+              </a:rPr>
+              <a:t>")</a:t>
+            </a:r>
+            <a:endParaRPr lang="en-US" dirty="0">
+              <a:latin typeface="+mj-lt"/>
+            </a:endParaRPr>
+          </a:p>
+          <a:p>
             <a:endParaRPr lang="en-US" dirty="0">
               <a:latin typeface="+mj-lt"/>
             </a:endParaRPr>
@@ -3772,15 +4102,114 @@
                   <a:srgbClr val="000000"/>
                 </a:solidFill>
                 <a:effectLst/>
-                <a:latin typeface="Open Sans" panose="020B0606030504020204" pitchFamily="34" charset="0"/>
+                <a:latin typeface="+mj-lt"/>
               </a:rPr>
               <a:t>- Parents that migrated in years of higher discharge and later onset of warm freshwater temperatures (&gt;17°C) were associated with higher juvenile production.</a:t>
             </a:r>
-            <a:endParaRPr lang="en-US" dirty="0">
-              <a:latin typeface="+mj-lt"/>
-            </a:endParaRPr>
-          </a:p>
-          <a:p>
+          </a:p>
+          <a:p>
+            <a:r>
+              <a:rPr lang="en-US" dirty="0">
+                <a:solidFill>
+                  <a:srgbClr val="000000"/>
+                </a:solidFill>
+                <a:latin typeface="+mj-lt"/>
+              </a:rPr>
+              <a:t>- </a:t>
+            </a:r>
+            <a:r>
+              <a:rPr lang="en-US" dirty="0">
+                <a:solidFill>
+                  <a:srgbClr val="000000"/>
+                </a:solidFill>
+                <a:highlight>
+                  <a:srgbClr val="FFFF00"/>
+                </a:highlight>
+                <a:latin typeface="+mj-lt"/>
+              </a:rPr>
+              <a:t>Index</a:t>
+            </a:r>
+            <a:r>
+              <a:rPr lang="en-US" dirty="0">
+                <a:solidFill>
+                  <a:srgbClr val="000000"/>
+                </a:solidFill>
+                <a:latin typeface="+mj-lt"/>
+              </a:rPr>
+              <a:t> of mean, max, min for June-August of returning year.  Done: </a:t>
+            </a:r>
+            <a:r>
+              <a:rPr lang="en-US" dirty="0" err="1">
+                <a:solidFill>
+                  <a:srgbClr val="000000"/>
+                </a:solidFill>
+                <a:latin typeface="+mj-lt"/>
+              </a:rPr>
+              <a:t>processed_covariates</a:t>
+            </a:r>
+            <a:r>
+              <a:rPr lang="en-US" dirty="0">
+                <a:solidFill>
+                  <a:srgbClr val="000000"/>
+                </a:solidFill>
+                <a:latin typeface="+mj-lt"/>
+              </a:rPr>
+              <a:t>/</a:t>
+            </a:r>
+            <a:r>
+              <a:rPr lang="en-US" dirty="0" err="1">
+                <a:solidFill>
+                  <a:srgbClr val="000000"/>
+                </a:solidFill>
+                <a:latin typeface="+mj-lt"/>
+              </a:rPr>
+              <a:t>Stage_b_Yukon_drainage.csv</a:t>
+            </a:r>
+            <a:r>
+              <a:rPr lang="en-US" dirty="0">
+                <a:solidFill>
+                  <a:srgbClr val="000000"/>
+                </a:solidFill>
+                <a:latin typeface="+mj-lt"/>
+              </a:rPr>
+              <a:t>"), </a:t>
+            </a:r>
+            <a:r>
+              <a:rPr lang="en-US" dirty="0" err="1">
+                <a:solidFill>
+                  <a:srgbClr val="000000"/>
+                </a:solidFill>
+                <a:latin typeface="+mj-lt"/>
+              </a:rPr>
+              <a:t>processed_covariates</a:t>
+            </a:r>
+            <a:r>
+              <a:rPr lang="en-US" dirty="0">
+                <a:solidFill>
+                  <a:srgbClr val="000000"/>
+                </a:solidFill>
+                <a:latin typeface="+mj-lt"/>
+              </a:rPr>
+              <a:t>/</a:t>
+            </a:r>
+            <a:r>
+              <a:rPr lang="en-US" dirty="0" err="1">
+                <a:solidFill>
+                  <a:srgbClr val="000000"/>
+                </a:solidFill>
+                <a:latin typeface="+mj-lt"/>
+              </a:rPr>
+              <a:t>Stage_b_kusko_drainage.csv</a:t>
+            </a:r>
+            <a:r>
+              <a:rPr lang="en-US" dirty="0">
+                <a:solidFill>
+                  <a:srgbClr val="000000"/>
+                </a:solidFill>
+                <a:latin typeface="+mj-lt"/>
+              </a:rPr>
+              <a:t>")</a:t>
+            </a:r>
             <a:endParaRPr lang="en-US" dirty="0">
               <a:latin typeface="+mj-lt"/>
             </a:endParaRPr>
@@ -3950,7 +4379,7 @@
         <p:spPr>
           <a:xfrm>
             <a:off x="0" y="0"/>
-            <a:ext cx="12636500" cy="13665279"/>
+            <a:ext cx="12636500" cy="14773275"/>
           </a:xfrm>
           <a:prstGeom prst="rect">
             <a:avLst/>
@@ -3965,6 +4394,9 @@
           <a:p>
             <a:r>
               <a:rPr lang="en-US" dirty="0">
+                <a:highlight>
+                  <a:srgbClr val="FFFF00"/>
+                </a:highlight>
                 <a:latin typeface="+mj-lt"/>
               </a:rPr>
               <a:t>Zooplankton  index - </a:t>
@@ -4089,6 +4521,68 @@
                 <a:latin typeface="+mj-lt"/>
               </a:rPr>
               <a:t>-temporal abundance counts M3 for zooplankton community</a:t>
+            </a:r>
+          </a:p>
+          <a:p>
+            <a:endParaRPr lang="en-US" dirty="0">
+              <a:latin typeface="+mj-lt"/>
+            </a:endParaRPr>
+          </a:p>
+          <a:p>
+            <a:r>
+              <a:rPr lang="en-US" dirty="0">
+                <a:highlight>
+                  <a:srgbClr val="FFFF00"/>
+                </a:highlight>
+                <a:latin typeface="+mj-lt"/>
+              </a:rPr>
+              <a:t>DONE</a:t>
+            </a:r>
+            <a:r>
+              <a:rPr lang="en-US" dirty="0">
+                <a:latin typeface="+mj-lt"/>
+              </a:rPr>
+              <a:t>:  </a:t>
+            </a:r>
+          </a:p>
+          <a:p>
+            <a:r>
+              <a:rPr lang="en-US" dirty="0">
+                <a:latin typeface="+mj-lt"/>
+              </a:rPr>
+              <a:t>- "data/</a:t>
+            </a:r>
+            <a:r>
+              <a:rPr lang="en-US" dirty="0" err="1">
+                <a:latin typeface="+mj-lt"/>
+              </a:rPr>
+              <a:t>covariate_large_zooplankton.csv</a:t>
+            </a:r>
+            <a:r>
+              <a:rPr lang="en-US" dirty="0">
+                <a:latin typeface="+mj-lt"/>
+              </a:rPr>
+              <a:t>” </a:t>
+            </a:r>
+          </a:p>
+          <a:p>
+            <a:r>
+              <a:rPr lang="en-US" dirty="0">
+                <a:latin typeface="+mj-lt"/>
+              </a:rPr>
+              <a:t>- "data/</a:t>
+            </a:r>
+            <a:r>
+              <a:rPr lang="en-US" dirty="0" err="1">
+                <a:latin typeface="+mj-lt"/>
+              </a:rPr>
+              <a:t>covariate_gelatinous_zooplankton.csv</a:t>
+            </a:r>
+            <a:r>
+              <a:rPr lang="en-US" dirty="0">
+                <a:latin typeface="+mj-lt"/>
+              </a:rPr>
+              <a:t>"</a:t>
             </a:r>
           </a:p>
           <a:p>
@@ -5107,9 +5601,18 @@
           <a:p>
             <a:r>
               <a:rPr lang="en-US" b="1" dirty="0">
-                <a:latin typeface="+mj-lt"/>
-              </a:rPr>
-              <a:t>DONE: </a:t>
+                <a:highlight>
+                  <a:srgbClr val="FFFF00"/>
+                </a:highlight>
+                <a:latin typeface="+mj-lt"/>
+              </a:rPr>
+              <a:t>DONE</a:t>
+            </a:r>
+            <a:r>
+              <a:rPr lang="en-US" b="1" dirty="0">
+                <a:latin typeface="+mj-lt"/>
+              </a:rPr>
+              <a:t>: </a:t>
             </a:r>
             <a:r>
               <a:rPr lang="en-US" dirty="0">
@@ -5205,6 +5708,9 @@
             <a:r>
               <a:rPr lang="en-US" sz="1800" dirty="0">
                 <a:effectLst/>
+                <a:highlight>
+                  <a:srgbClr val="FFFF00"/>
+                </a:highlight>
                 <a:latin typeface="Calibri Light" panose="020F0302020204030204" pitchFamily="34" charset="0"/>
                 <a:ea typeface="Calibri" panose="020F0502020204030204" pitchFamily="34" charset="0"/>
               </a:rPr>
@@ -5215,6 +5721,9 @@
             <a:r>
               <a:rPr lang="en-US" sz="1800" dirty="0">
                 <a:effectLst/>
+                <a:highlight>
+                  <a:srgbClr val="FFFF00"/>
+                </a:highlight>
                 <a:latin typeface="Calibri Light" panose="020F0302020204030204" pitchFamily="34" charset="0"/>
                 <a:ea typeface="Calibri" panose="020F0502020204030204" pitchFamily="34" charset="0"/>
               </a:rPr>
@@ -5479,6 +5988,9 @@
           <a:p>
             <a:r>
               <a:rPr lang="en-US" dirty="0">
+                <a:highlight>
+                  <a:srgbClr val="FFFF00"/>
+                </a:highlight>
                 <a:latin typeface="Calibri Light" panose="020F0302020204030204" pitchFamily="34" charset="0"/>
               </a:rPr>
               <a:t>DONE</a:t>
@@ -5558,7 +6070,7 @@
         <p:spPr>
           <a:xfrm>
             <a:off x="-3242" y="29175"/>
-            <a:ext cx="11964773" cy="9233297"/>
+            <a:ext cx="11964773" cy="9510296"/>
           </a:xfrm>
           <a:prstGeom prst="rect">
             <a:avLst/>
@@ -5677,138 +6189,155 @@
           <a:p>
             <a:r>
               <a:rPr lang="en-US" b="1" dirty="0">
+                <a:highlight>
+                  <a:srgbClr val="FFFF00"/>
+                </a:highlight>
                 <a:latin typeface="+mj-lt"/>
               </a:rPr>
               <a:t>Index format (ended up creating 2)</a:t>
             </a:r>
+          </a:p>
+          <a:p>
+            <a:r>
+              <a:rPr lang="en-US" b="1" dirty="0">
+                <a:highlight>
+                  <a:srgbClr val="FFFF00"/>
+                </a:highlight>
+                <a:latin typeface="+mj-lt"/>
+              </a:rPr>
+              <a:t>DONE</a:t>
+            </a:r>
+            <a:endParaRPr lang="en-US" dirty="0">
+              <a:highlight>
+                <a:srgbClr val="FFFF00"/>
+              </a:highlight>
+              <a:latin typeface="+mj-lt"/>
+            </a:endParaRPr>
+          </a:p>
+          <a:p>
+            <a:r>
+              <a:rPr lang="en-US" dirty="0">
+                <a:latin typeface="+mj-lt"/>
+              </a:rPr>
+              <a:t>- Sum of all Pink salmon releases from AK and Asia (</a:t>
+            </a:r>
+            <a:r>
+              <a:rPr lang="en-US" dirty="0" err="1">
+                <a:latin typeface="+mj-lt"/>
+              </a:rPr>
+              <a:t>Ruggerone</a:t>
+            </a:r>
+            <a:r>
+              <a:rPr lang="en-US" dirty="0">
+                <a:latin typeface="+mj-lt"/>
+              </a:rPr>
+              <a:t> 2003) (saved as: output/</a:t>
+            </a:r>
+            <a:r>
+              <a:rPr lang="en-US" dirty="0" err="1">
+                <a:latin typeface="+mj-lt"/>
+              </a:rPr>
+              <a:t>hatchery_Pink_Covariate_AKandAsia.csv</a:t>
+            </a:r>
+            <a:r>
+              <a:rPr lang="en-US" dirty="0">
+                <a:latin typeface="+mj-lt"/>
+              </a:rPr>
+              <a:t>)</a:t>
+            </a:r>
+          </a:p>
+          <a:p>
+            <a:r>
+              <a:rPr lang="en-US" dirty="0">
+                <a:latin typeface="+mj-lt"/>
+              </a:rPr>
+              <a:t>	- OR total Pink salmon abundance (</a:t>
+            </a:r>
+            <a:r>
+              <a:rPr lang="en-US" dirty="0" err="1">
+                <a:latin typeface="+mj-lt"/>
+              </a:rPr>
+              <a:t>Cunnigham</a:t>
+            </a:r>
+            <a:r>
+              <a:rPr lang="en-US" dirty="0">
+                <a:latin typeface="+mj-lt"/>
+              </a:rPr>
+              <a:t> et al 2018 argue that this is a better metric </a:t>
+            </a:r>
+            <a:r>
+              <a:rPr lang="en-US" dirty="0" err="1">
+                <a:latin typeface="+mj-lt"/>
+              </a:rPr>
+              <a:t>bc</a:t>
+            </a:r>
+            <a:r>
+              <a:rPr lang="en-US" dirty="0">
+                <a:latin typeface="+mj-lt"/>
+              </a:rPr>
+              <a:t> there is a lot of marine mortality for hatchery pinks). Should consider but haven’t done it yet. </a:t>
+            </a:r>
+          </a:p>
+          <a:p>
+            <a:r>
+              <a:rPr lang="en-US" dirty="0">
+                <a:latin typeface="+mj-lt"/>
+              </a:rPr>
+              <a:t>- Sum of all Chum salmon releases from Japan, Asia and AK (Myers et al 2004) suggests Yukon chum and hatchery fish compete in the GOA. (saved as: output/</a:t>
+            </a:r>
+            <a:r>
+              <a:rPr lang="en-US" dirty="0" err="1">
+                <a:latin typeface="+mj-lt"/>
+              </a:rPr>
+              <a:t>hatchery_Chum_Covariate_AKandAsia.csv</a:t>
+            </a:r>
+            <a:r>
+              <a:rPr lang="en-US" dirty="0">
+                <a:latin typeface="+mj-lt"/>
+              </a:rPr>
+              <a:t>)</a:t>
+            </a:r>
+          </a:p>
+          <a:p>
+            <a:r>
+              <a:rPr lang="en-US" dirty="0">
+                <a:latin typeface="+mj-lt"/>
+              </a:rPr>
+              <a:t>- “4-year moving average of Asian chum salmon abundance (Asian </a:t>
+            </a:r>
+            <a:r>
+              <a:rPr lang="en-US" dirty="0" err="1">
+                <a:latin typeface="+mj-lt"/>
+              </a:rPr>
+              <a:t>chumst</a:t>
+            </a:r>
+            <a:r>
+              <a:rPr lang="en-US" dirty="0">
+                <a:latin typeface="+mj-lt"/>
+              </a:rPr>
+              <a:t>)to coincide with the 4- to 5-year life cycle pattern that dominates North Pacific chum salmon.” (</a:t>
+            </a:r>
+            <a:r>
+              <a:rPr lang="en-US" dirty="0" err="1">
+                <a:latin typeface="+mj-lt"/>
+              </a:rPr>
+              <a:t>Agler</a:t>
+            </a:r>
+            <a:r>
+              <a:rPr lang="en-US" dirty="0">
+                <a:latin typeface="+mj-lt"/>
+              </a:rPr>
+              <a:t> 2013 – more evidence for Asian chum than pink)</a:t>
+            </a:r>
+          </a:p>
+          <a:p>
             <a:endParaRPr lang="en-US" dirty="0">
               <a:latin typeface="+mj-lt"/>
             </a:endParaRPr>
           </a:p>
           <a:p>
             <a:r>
-              <a:rPr lang="en-US" dirty="0">
-                <a:latin typeface="+mj-lt"/>
-              </a:rPr>
-              <a:t>- Sum of all Pink salmon releases from AK and Asia (</a:t>
-            </a:r>
-            <a:r>
-              <a:rPr lang="en-US" dirty="0" err="1">
-                <a:latin typeface="+mj-lt"/>
-              </a:rPr>
-              <a:t>Ruggerone</a:t>
-            </a:r>
-            <a:r>
-              <a:rPr lang="en-US" dirty="0">
-                <a:latin typeface="+mj-lt"/>
-              </a:rPr>
-              <a:t> 2003) (saved as: output/</a:t>
-            </a:r>
-            <a:r>
-              <a:rPr lang="en-US" dirty="0" err="1">
-                <a:latin typeface="+mj-lt"/>
-              </a:rPr>
-              <a:t>hatchery_Pink_Covariate_AKandAsia.csv</a:t>
-            </a:r>
-            <a:r>
-              <a:rPr lang="en-US" dirty="0">
-                <a:latin typeface="+mj-lt"/>
-              </a:rPr>
-              <a:t>)</a:t>
-            </a:r>
-          </a:p>
-          <a:p>
-            <a:r>
-              <a:rPr lang="en-US" dirty="0">
-                <a:latin typeface="+mj-lt"/>
-              </a:rPr>
-              <a:t>	- OR total Pink salmon abundance (</a:t>
-            </a:r>
-            <a:r>
-              <a:rPr lang="en-US" dirty="0" err="1">
-                <a:latin typeface="+mj-lt"/>
-              </a:rPr>
-              <a:t>Cunnigham</a:t>
-            </a:r>
-            <a:r>
-              <a:rPr lang="en-US" dirty="0">
-                <a:latin typeface="+mj-lt"/>
-              </a:rPr>
-              <a:t> et al 2018 argue that this is a better metric </a:t>
-            </a:r>
-            <a:r>
-              <a:rPr lang="en-US" dirty="0" err="1">
-                <a:latin typeface="+mj-lt"/>
-              </a:rPr>
-              <a:t>bc</a:t>
-            </a:r>
-            <a:r>
-              <a:rPr lang="en-US" dirty="0">
-                <a:latin typeface="+mj-lt"/>
-              </a:rPr>
-              <a:t> there is a lot of marine mortality for hatchery pinks). Should consider but haven’t done it yet. </a:t>
-            </a:r>
-          </a:p>
-          <a:p>
-            <a:r>
-              <a:rPr lang="en-US" dirty="0">
-                <a:latin typeface="+mj-lt"/>
-              </a:rPr>
-              <a:t>- Sum of all Chum salmon releases from Japan, Asia and AK (Myers et al 2004) suggests Yukon chum and hatchery fish compete in the GOA. (saved as: output/</a:t>
-            </a:r>
-            <a:r>
-              <a:rPr lang="en-US" dirty="0" err="1">
-                <a:latin typeface="+mj-lt"/>
-              </a:rPr>
-              <a:t>hatchery_Chum_Covariate_AKandAsia.csv</a:t>
-            </a:r>
-            <a:r>
-              <a:rPr lang="en-US" dirty="0">
-                <a:latin typeface="+mj-lt"/>
-              </a:rPr>
-              <a:t>)</a:t>
-            </a:r>
-          </a:p>
-          <a:p>
-            <a:r>
-              <a:rPr lang="en-US" dirty="0">
-                <a:latin typeface="+mj-lt"/>
-              </a:rPr>
-              <a:t>- “4-year moving average of Asian chum salmon abundance (Asian </a:t>
-            </a:r>
-            <a:r>
-              <a:rPr lang="en-US" dirty="0" err="1">
-                <a:latin typeface="+mj-lt"/>
-              </a:rPr>
-              <a:t>chumst</a:t>
-            </a:r>
-            <a:r>
-              <a:rPr lang="en-US" dirty="0">
-                <a:latin typeface="+mj-lt"/>
-              </a:rPr>
-              <a:t>)to coincide with the 4- to 5-year life cycle pattern that dominates North Pacific chum salmon.” (</a:t>
-            </a:r>
-            <a:r>
-              <a:rPr lang="en-US" dirty="0" err="1">
-                <a:latin typeface="+mj-lt"/>
-              </a:rPr>
-              <a:t>Agler</a:t>
-            </a:r>
-            <a:r>
-              <a:rPr lang="en-US" dirty="0">
-                <a:latin typeface="+mj-lt"/>
-              </a:rPr>
-              <a:t> 2013 – more evidence for Asian chum than pink)</a:t>
-            </a:r>
-          </a:p>
-          <a:p>
-            <a:endParaRPr lang="en-US" dirty="0">
-              <a:latin typeface="+mj-lt"/>
-            </a:endParaRPr>
-          </a:p>
-          <a:p>
-            <a:r>
-              <a:rPr lang="en-US" dirty="0">
+              <a:rPr lang="en-US" b="1" dirty="0">
                 <a:latin typeface="+mj-lt"/>
               </a:rPr>
               <a:t>Notes:</a:t>

</xml_diff>

<commit_message>
poster and sim troubleshoot
still trouble shooting the simulation
</commit_message>
<xml_diff>
--- a/notes/Covariate_notes.pptx
+++ b/notes/Covariate_notes.pptx
@@ -218,7 +218,7 @@
           <a:p>
             <a:fld id="{CEEAF3CF-3DD3-6246-B19C-D9BA3176297E}" type="datetimeFigureOut">
               <a:rPr lang="en-US" smtClean="0"/>
-              <a:t>2/20/24</a:t>
+              <a:t>3/15/24</a:t>
             </a:fld>
             <a:endParaRPr lang="en-US"/>
           </a:p>
@@ -1593,7 +1593,7 @@
           <a:p>
             <a:fld id="{B6D2E018-ECA7-624B-9A15-2C855CF6C189}" type="datetimeFigureOut">
               <a:rPr lang="en-US" smtClean="0"/>
-              <a:t>2/20/24</a:t>
+              <a:t>3/15/24</a:t>
             </a:fld>
             <a:endParaRPr lang="en-US"/>
           </a:p>
@@ -1791,7 +1791,7 @@
           <a:p>
             <a:fld id="{B6D2E018-ECA7-624B-9A15-2C855CF6C189}" type="datetimeFigureOut">
               <a:rPr lang="en-US" smtClean="0"/>
-              <a:t>2/20/24</a:t>
+              <a:t>3/15/24</a:t>
             </a:fld>
             <a:endParaRPr lang="en-US"/>
           </a:p>
@@ -1999,7 +1999,7 @@
           <a:p>
             <a:fld id="{B6D2E018-ECA7-624B-9A15-2C855CF6C189}" type="datetimeFigureOut">
               <a:rPr lang="en-US" smtClean="0"/>
-              <a:t>2/20/24</a:t>
+              <a:t>3/15/24</a:t>
             </a:fld>
             <a:endParaRPr lang="en-US"/>
           </a:p>
@@ -2197,7 +2197,7 @@
           <a:p>
             <a:fld id="{B6D2E018-ECA7-624B-9A15-2C855CF6C189}" type="datetimeFigureOut">
               <a:rPr lang="en-US" smtClean="0"/>
-              <a:t>2/20/24</a:t>
+              <a:t>3/15/24</a:t>
             </a:fld>
             <a:endParaRPr lang="en-US"/>
           </a:p>
@@ -2472,7 +2472,7 @@
           <a:p>
             <a:fld id="{B6D2E018-ECA7-624B-9A15-2C855CF6C189}" type="datetimeFigureOut">
               <a:rPr lang="en-US" smtClean="0"/>
-              <a:t>2/20/24</a:t>
+              <a:t>3/15/24</a:t>
             </a:fld>
             <a:endParaRPr lang="en-US"/>
           </a:p>
@@ -2737,7 +2737,7 @@
           <a:p>
             <a:fld id="{B6D2E018-ECA7-624B-9A15-2C855CF6C189}" type="datetimeFigureOut">
               <a:rPr lang="en-US" smtClean="0"/>
-              <a:t>2/20/24</a:t>
+              <a:t>3/15/24</a:t>
             </a:fld>
             <a:endParaRPr lang="en-US"/>
           </a:p>
@@ -3149,7 +3149,7 @@
           <a:p>
             <a:fld id="{B6D2E018-ECA7-624B-9A15-2C855CF6C189}" type="datetimeFigureOut">
               <a:rPr lang="en-US" smtClean="0"/>
-              <a:t>2/20/24</a:t>
+              <a:t>3/15/24</a:t>
             </a:fld>
             <a:endParaRPr lang="en-US"/>
           </a:p>
@@ -3290,7 +3290,7 @@
           <a:p>
             <a:fld id="{B6D2E018-ECA7-624B-9A15-2C855CF6C189}" type="datetimeFigureOut">
               <a:rPr lang="en-US" smtClean="0"/>
-              <a:t>2/20/24</a:t>
+              <a:t>3/15/24</a:t>
             </a:fld>
             <a:endParaRPr lang="en-US"/>
           </a:p>
@@ -3403,7 +3403,7 @@
           <a:p>
             <a:fld id="{B6D2E018-ECA7-624B-9A15-2C855CF6C189}" type="datetimeFigureOut">
               <a:rPr lang="en-US" smtClean="0"/>
-              <a:t>2/20/24</a:t>
+              <a:t>3/15/24</a:t>
             </a:fld>
             <a:endParaRPr lang="en-US"/>
           </a:p>
@@ -3714,7 +3714,7 @@
           <a:p>
             <a:fld id="{B6D2E018-ECA7-624B-9A15-2C855CF6C189}" type="datetimeFigureOut">
               <a:rPr lang="en-US" smtClean="0"/>
-              <a:t>2/20/24</a:t>
+              <a:t>3/15/24</a:t>
             </a:fld>
             <a:endParaRPr lang="en-US"/>
           </a:p>
@@ -4002,7 +4002,7 @@
           <a:p>
             <a:fld id="{B6D2E018-ECA7-624B-9A15-2C855CF6C189}" type="datetimeFigureOut">
               <a:rPr lang="en-US" smtClean="0"/>
-              <a:t>2/20/24</a:t>
+              <a:t>3/15/24</a:t>
             </a:fld>
             <a:endParaRPr lang="en-US"/>
           </a:p>
@@ -4243,7 +4243,7 @@
           <a:p>
             <a:fld id="{B6D2E018-ECA7-624B-9A15-2C855CF6C189}" type="datetimeFigureOut">
               <a:rPr lang="en-US" smtClean="0"/>
-              <a:t>2/20/24</a:t>
+              <a:t>3/15/24</a:t>
             </a:fld>
             <a:endParaRPr lang="en-US"/>
           </a:p>

</xml_diff>